<commit_message>
fixed volume 17/06 16h30
</commit_message>
<xml_diff>
--- a/stress_ball.pptx
+++ b/stress_ball.pptx
@@ -7198,10 +7198,16 @@
               <a:buNone/>
             </a:pPr>
             <a:r>
-              <a:rPr lang="en" sz="12900" dirty="0"/>
+              <a:rPr lang="en" sz="8800" dirty="0">
+                <a:latin typeface="Courier New" panose="02070309020205020404" pitchFamily="49" charset="0"/>
+                <a:cs typeface="Courier New" panose="02070309020205020404" pitchFamily="49" charset="0"/>
+              </a:rPr>
               <a:t>stress|ball</a:t>
             </a:r>
-            <a:endParaRPr sz="12900" dirty="0"/>
+            <a:endParaRPr sz="8800" dirty="0">
+              <a:latin typeface="Courier New" panose="02070309020205020404" pitchFamily="49" charset="0"/>
+              <a:cs typeface="Courier New" panose="02070309020205020404" pitchFamily="49" charset="0"/>
+            </a:endParaRPr>
           </a:p>
         </p:txBody>
       </p:sp>
@@ -7217,8 +7223,8 @@
         </p:nvSpPr>
         <p:spPr>
           <a:xfrm>
-            <a:off x="416325" y="4312850"/>
-            <a:ext cx="8305500" cy="554100"/>
+            <a:off x="416325" y="4374538"/>
+            <a:ext cx="8305500" cy="492412"/>
           </a:xfrm>
           <a:prstGeom prst="rect">
             <a:avLst/>
@@ -7240,10 +7246,16 @@
               <a:buNone/>
             </a:pPr>
             <a:r>
-              <a:rPr lang="en" sz="2400"/>
+              <a:rPr lang="en" sz="2000" dirty="0">
+                <a:latin typeface="Courier New" panose="02070309020205020404" pitchFamily="49" charset="0"/>
+                <a:cs typeface="Courier New" panose="02070309020205020404" pitchFamily="49" charset="0"/>
+              </a:rPr>
               <a:t>by Rita Mak</a:t>
             </a:r>
-            <a:endParaRPr sz="2400" b="1"/>
+            <a:endParaRPr sz="2000" dirty="0">
+              <a:latin typeface="Courier New" panose="02070309020205020404" pitchFamily="49" charset="0"/>
+              <a:cs typeface="Courier New" panose="02070309020205020404" pitchFamily="49" charset="0"/>
+            </a:endParaRPr>
           </a:p>
         </p:txBody>
       </p:sp>
@@ -7255,8 +7267,8 @@
         </p:nvSpPr>
         <p:spPr>
           <a:xfrm>
-            <a:off x="5624623" y="4389800"/>
-            <a:ext cx="3519376" cy="400079"/>
+            <a:off x="4428781" y="4325275"/>
+            <a:ext cx="4715219" cy="461635"/>
           </a:xfrm>
           <a:prstGeom prst="rect">
             <a:avLst/>
@@ -7282,17 +7294,21 @@
               <a:buNone/>
             </a:pPr>
             <a:r>
-              <a:rPr lang="en" b="1" dirty="0">
+              <a:rPr lang="en" sz="1800" b="1" dirty="0">
                 <a:solidFill>
                   <a:schemeClr val="lt1"/>
                 </a:solidFill>
+                <a:latin typeface="Courier New" panose="02070309020205020404" pitchFamily="49" charset="0"/>
+                <a:cs typeface="Courier New" panose="02070309020205020404" pitchFamily="49" charset="0"/>
               </a:rPr>
-              <a:t>https://ritamak.github.io/stress-ball/</a:t>
+              <a:t>ritamak.github.io/stress-ball/</a:t>
             </a:r>
-            <a:endParaRPr b="1" dirty="0">
+            <a:endParaRPr sz="1800" b="1" dirty="0">
               <a:solidFill>
                 <a:schemeClr val="lt1"/>
               </a:solidFill>
+              <a:latin typeface="Courier New" panose="02070309020205020404" pitchFamily="49" charset="0"/>
+              <a:cs typeface="Courier New" panose="02070309020205020404" pitchFamily="49" charset="0"/>
             </a:endParaRPr>
           </a:p>
         </p:txBody>
@@ -7369,6 +7385,8 @@
                 <a:solidFill>
                   <a:srgbClr val="FF0000"/>
                 </a:solidFill>
+                <a:latin typeface="Courier New" panose="02070309020205020404" pitchFamily="49" charset="0"/>
+                <a:cs typeface="Courier New" panose="02070309020205020404" pitchFamily="49" charset="0"/>
               </a:rPr>
               <a:t>The game</a:t>
             </a:r>
@@ -7376,6 +7394,8 @@
               <a:solidFill>
                 <a:srgbClr val="FF0000"/>
               </a:solidFill>
+              <a:latin typeface="Courier New" panose="02070309020205020404" pitchFamily="49" charset="0"/>
+              <a:cs typeface="Courier New" panose="02070309020205020404" pitchFamily="49" charset="0"/>
             </a:endParaRPr>
           </a:p>
         </p:txBody>
@@ -7420,68 +7440,68 @@
               <a:buChar char="●"/>
             </a:pPr>
             <a:r>
-              <a:rPr lang="en" sz="1800" b="0" dirty="0">
-                <a:latin typeface="Lato"/>
+              <a:rPr lang="en-US" sz="1400" b="0" dirty="0">
+                <a:latin typeface="Courier New" panose="02070309020205020404" pitchFamily="49" charset="0"/>
                 <a:ea typeface="Lato"/>
-                <a:cs typeface="Lato"/>
+                <a:cs typeface="Courier New" panose="02070309020205020404" pitchFamily="49" charset="0"/>
                 <a:sym typeface="Lato"/>
               </a:rPr>
               <a:t>At first, it has a</a:t>
             </a:r>
             <a:r>
-              <a:rPr lang="en" sz="1800" b="0" u="sng" dirty="0">
-                <a:latin typeface="Lato"/>
+              <a:rPr lang="en-US" sz="1400" b="0" u="sng" dirty="0">
+                <a:latin typeface="Courier New" panose="02070309020205020404" pitchFamily="49" charset="0"/>
                 <a:ea typeface="Lato"/>
-                <a:cs typeface="Lato"/>
+                <a:cs typeface="Courier New" panose="02070309020205020404" pitchFamily="49" charset="0"/>
                 <a:sym typeface="Lato"/>
               </a:rPr>
               <a:t> </a:t>
             </a:r>
             <a:r>
-              <a:rPr lang="en" sz="1800" b="0" u="sng" dirty="0">
+              <a:rPr lang="en-US" sz="1400" b="0" u="sng" dirty="0">
                 <a:solidFill>
                   <a:schemeClr val="bg2"/>
                 </a:solidFill>
-                <a:latin typeface="Lato"/>
+                <a:latin typeface="Courier New" panose="02070309020205020404" pitchFamily="49" charset="0"/>
                 <a:ea typeface="Lato"/>
-                <a:cs typeface="Lato"/>
+                <a:cs typeface="Courier New" panose="02070309020205020404" pitchFamily="49" charset="0"/>
                 <a:sym typeface="Lato"/>
               </a:rPr>
               <a:t>white ball</a:t>
             </a:r>
             <a:r>
-              <a:rPr lang="en" sz="1800" b="0" dirty="0">
+              <a:rPr lang="en-US" sz="1400" b="0" dirty="0">
                 <a:solidFill>
                   <a:schemeClr val="bg2"/>
                 </a:solidFill>
-                <a:latin typeface="Lato"/>
+                <a:latin typeface="Courier New" panose="02070309020205020404" pitchFamily="49" charset="0"/>
                 <a:ea typeface="Lato"/>
-                <a:cs typeface="Lato"/>
+                <a:cs typeface="Courier New" panose="02070309020205020404" pitchFamily="49" charset="0"/>
                 <a:sym typeface="Lato"/>
               </a:rPr>
               <a:t> </a:t>
             </a:r>
             <a:r>
-              <a:rPr lang="en" sz="1800" b="0" dirty="0">
-                <a:latin typeface="Lato"/>
+              <a:rPr lang="en-US" sz="1400" b="0" dirty="0">
+                <a:latin typeface="Courier New" panose="02070309020205020404" pitchFamily="49" charset="0"/>
                 <a:ea typeface="Lato"/>
-                <a:cs typeface="Lato"/>
+                <a:cs typeface="Courier New" panose="02070309020205020404" pitchFamily="49" charset="0"/>
                 <a:sym typeface="Lato"/>
               </a:rPr>
               <a:t>moving to random places inside the canvas;</a:t>
             </a:r>
             <a:br>
-              <a:rPr lang="en" sz="1800" b="0" dirty="0">
-                <a:latin typeface="Lato"/>
+              <a:rPr lang="en-US" sz="1400" b="0" dirty="0">
+                <a:latin typeface="Courier New" panose="02070309020205020404" pitchFamily="49" charset="0"/>
                 <a:ea typeface="Lato"/>
-                <a:cs typeface="Lato"/>
+                <a:cs typeface="Courier New" panose="02070309020205020404" pitchFamily="49" charset="0"/>
                 <a:sym typeface="Lato"/>
               </a:rPr>
             </a:br>
-            <a:endParaRPr sz="1800" b="0" dirty="0">
-              <a:latin typeface="Lato"/>
+            <a:endParaRPr lang="en-US" sz="1400" b="0" dirty="0">
+              <a:latin typeface="Courier New" panose="02070309020205020404" pitchFamily="49" charset="0"/>
               <a:ea typeface="Lato"/>
-              <a:cs typeface="Lato"/>
+              <a:cs typeface="Courier New" panose="02070309020205020404" pitchFamily="49" charset="0"/>
               <a:sym typeface="Lato"/>
             </a:endParaRPr>
           </a:p>
@@ -7501,26 +7521,26 @@
               <a:buChar char="●"/>
             </a:pPr>
             <a:r>
-              <a:rPr lang="en" sz="1800" b="0" dirty="0">
-                <a:latin typeface="Lato"/>
+              <a:rPr lang="en-US" sz="1400" b="0" dirty="0">
+                <a:latin typeface="Courier New" panose="02070309020205020404" pitchFamily="49" charset="0"/>
                 <a:ea typeface="Lato"/>
-                <a:cs typeface="Lato"/>
+                <a:cs typeface="Courier New" panose="02070309020205020404" pitchFamily="49" charset="0"/>
                 <a:sym typeface="Lato"/>
               </a:rPr>
-              <a:t>The user has to be quick enough to click inside of the ball when the ball appears;</a:t>
+              <a:t>The user must be quick enough to click inside of the ball when the ball appears;</a:t>
             </a:r>
             <a:br>
-              <a:rPr lang="en" sz="1800" b="0" dirty="0">
-                <a:latin typeface="Lato"/>
+              <a:rPr lang="en-US" sz="1400" b="0" dirty="0">
+                <a:latin typeface="Courier New" panose="02070309020205020404" pitchFamily="49" charset="0"/>
                 <a:ea typeface="Lato"/>
-                <a:cs typeface="Lato"/>
+                <a:cs typeface="Courier New" panose="02070309020205020404" pitchFamily="49" charset="0"/>
                 <a:sym typeface="Lato"/>
               </a:rPr>
             </a:br>
-            <a:endParaRPr sz="1800" b="0" dirty="0">
-              <a:latin typeface="Lato"/>
+            <a:endParaRPr lang="en-US" sz="1400" b="0" dirty="0">
+              <a:latin typeface="Courier New" panose="02070309020205020404" pitchFamily="49" charset="0"/>
               <a:ea typeface="Lato"/>
-              <a:cs typeface="Lato"/>
+              <a:cs typeface="Courier New" panose="02070309020205020404" pitchFamily="49" charset="0"/>
               <a:sym typeface="Lato"/>
             </a:endParaRPr>
           </a:p>
@@ -7540,26 +7560,26 @@
               <a:buChar char="●"/>
             </a:pPr>
             <a:r>
-              <a:rPr lang="en" sz="1800" b="0" dirty="0">
-                <a:latin typeface="Lato"/>
+              <a:rPr lang="en-US" sz="1400" b="0" dirty="0">
+                <a:latin typeface="Courier New" panose="02070309020205020404" pitchFamily="49" charset="0"/>
                 <a:ea typeface="Lato"/>
-                <a:cs typeface="Lato"/>
+                <a:cs typeface="Courier New" panose="02070309020205020404" pitchFamily="49" charset="0"/>
                 <a:sym typeface="Lato"/>
               </a:rPr>
-              <a:t>Every 10 seconds the difficulty increases and the ball moves faster. In the last level a black ball appears to create a more challenging environment ;</a:t>
+              <a:t>Every 10 seconds the difficulty increases, and the ball moves faster. In the last level a black ball appears;</a:t>
             </a:r>
             <a:br>
-              <a:rPr lang="en" sz="1800" b="0" dirty="0">
-                <a:latin typeface="Lato"/>
+              <a:rPr lang="en-US" sz="1400" b="0" dirty="0">
+                <a:latin typeface="Courier New" panose="02070309020205020404" pitchFamily="49" charset="0"/>
                 <a:ea typeface="Lato"/>
-                <a:cs typeface="Lato"/>
+                <a:cs typeface="Courier New" panose="02070309020205020404" pitchFamily="49" charset="0"/>
                 <a:sym typeface="Lato"/>
               </a:rPr>
             </a:br>
-            <a:endParaRPr sz="1800" b="0" dirty="0">
-              <a:latin typeface="Lato"/>
+            <a:endParaRPr lang="en-US" sz="1400" b="0" dirty="0">
+              <a:latin typeface="Courier New" panose="02070309020205020404" pitchFamily="49" charset="0"/>
               <a:ea typeface="Lato"/>
-              <a:cs typeface="Lato"/>
+              <a:cs typeface="Courier New" panose="02070309020205020404" pitchFamily="49" charset="0"/>
               <a:sym typeface="Lato"/>
             </a:endParaRPr>
           </a:p>
@@ -7579,20 +7599,14 @@
               <a:buChar char="●"/>
             </a:pPr>
             <a:r>
-              <a:rPr lang="en" sz="1800" b="0" dirty="0">
-                <a:latin typeface="Lato"/>
+              <a:rPr lang="en-US" sz="1400" b="0" dirty="0">
+                <a:latin typeface="Courier New" panose="02070309020205020404" pitchFamily="49" charset="0"/>
                 <a:ea typeface="Lato"/>
-                <a:cs typeface="Lato"/>
+                <a:cs typeface="Courier New" panose="02070309020205020404" pitchFamily="49" charset="0"/>
                 <a:sym typeface="Lato"/>
               </a:rPr>
               <a:t>If the user fails to click inside the ball, the user loses the game.</a:t>
             </a:r>
-            <a:endParaRPr sz="1800" b="0" dirty="0">
-              <a:latin typeface="Lato"/>
-              <a:ea typeface="Lato"/>
-              <a:cs typeface="Lato"/>
-              <a:sym typeface="Lato"/>
-            </a:endParaRPr>
           </a:p>
         </p:txBody>
       </p:sp>
@@ -7664,10 +7678,16 @@
               <a:buNone/>
             </a:pPr>
             <a:r>
-              <a:rPr lang="en"/>
+              <a:rPr lang="en" dirty="0">
+                <a:latin typeface="Courier New" panose="02070309020205020404" pitchFamily="49" charset="0"/>
+                <a:cs typeface="Courier New" panose="02070309020205020404" pitchFamily="49" charset="0"/>
+              </a:rPr>
               <a:t>Challenges</a:t>
             </a:r>
-            <a:endParaRPr/>
+            <a:endParaRPr dirty="0">
+              <a:latin typeface="Courier New" panose="02070309020205020404" pitchFamily="49" charset="0"/>
+              <a:cs typeface="Courier New" panose="02070309020205020404" pitchFamily="49" charset="0"/>
+            </a:endParaRPr>
           </a:p>
         </p:txBody>
       </p:sp>
@@ -7825,22 +7845,6 @@
           </a:bodyPr>
           <a:lstStyle/>
           <a:p>
-            <a:pPr marL="0" lvl="0" indent="0" algn="l" rtl="0">
-              <a:spcBef>
-                <a:spcPts val="0"/>
-              </a:spcBef>
-              <a:spcAft>
-                <a:spcPts val="0"/>
-              </a:spcAft>
-              <a:buNone/>
-            </a:pPr>
-            <a:endParaRPr sz="2100" dirty="0">
-              <a:solidFill>
-                <a:schemeClr val="lt1"/>
-              </a:solidFill>
-            </a:endParaRPr>
-          </a:p>
-          <a:p>
             <a:pPr marL="0" lvl="0" indent="0" algn="ctr" rtl="0">
               <a:spcBef>
                 <a:spcPts val="1200"/>
@@ -7851,59 +7855,18 @@
               <a:buNone/>
             </a:pPr>
             <a:r>
-              <a:rPr lang="en" sz="2000" dirty="0"/>
+              <a:rPr lang="en" sz="2000" dirty="0">
+                <a:latin typeface="Courier New" panose="02070309020205020404" pitchFamily="49" charset="0"/>
+                <a:cs typeface="Courier New" panose="02070309020205020404" pitchFamily="49" charset="0"/>
+              </a:rPr>
               <a:t>changing the game levels, increasing the velocity of the moving ball</a:t>
             </a:r>
             <a:endParaRPr sz="2000" dirty="0">
               <a:solidFill>
                 <a:schemeClr val="lt1"/>
               </a:solidFill>
-            </a:endParaRPr>
-          </a:p>
-        </p:txBody>
-      </p:sp>
-      <p:sp>
-        <p:nvSpPr>
-          <p:cNvPr id="90" name="Google Shape;90;p15"/>
-          <p:cNvSpPr txBox="1"/>
-          <p:nvPr/>
-        </p:nvSpPr>
-        <p:spPr>
-          <a:xfrm>
-            <a:off x="283100" y="4654975"/>
-            <a:ext cx="6244200" cy="257700"/>
-          </a:xfrm>
-          <a:prstGeom prst="rect">
-            <a:avLst/>
-          </a:prstGeom>
-          <a:noFill/>
-          <a:ln>
-            <a:noFill/>
-          </a:ln>
-        </p:spPr>
-        <p:txBody>
-          <a:bodyPr spcFirstLastPara="1" wrap="square" lIns="91425" tIns="91425" rIns="91425" bIns="91425" anchor="ctr" anchorCtr="0">
-            <a:noAutofit/>
-          </a:bodyPr>
-          <a:lstStyle/>
-          <a:p>
-            <a:pPr marL="0" lvl="0" indent="0" algn="l" rtl="0">
-              <a:spcBef>
-                <a:spcPts val="0"/>
-              </a:spcBef>
-              <a:spcAft>
-                <a:spcPts val="0"/>
-              </a:spcAft>
-              <a:buNone/>
-            </a:pPr>
-            <a:endParaRPr sz="1200" i="1">
-              <a:solidFill>
-                <a:schemeClr val="accent5"/>
-              </a:solidFill>
-              <a:latin typeface="Lato"/>
-              <a:ea typeface="Lato"/>
-              <a:cs typeface="Lato"/>
-              <a:sym typeface="Lato"/>
+              <a:latin typeface="Courier New" panose="02070309020205020404" pitchFamily="49" charset="0"/>
+              <a:cs typeface="Courier New" panose="02070309020205020404" pitchFamily="49" charset="0"/>
             </a:endParaRPr>
           </a:p>
         </p:txBody>
@@ -7933,22 +7896,6 @@
           </a:bodyPr>
           <a:lstStyle/>
           <a:p>
-            <a:pPr marL="0" lvl="0" indent="0" algn="l" rtl="0">
-              <a:spcBef>
-                <a:spcPts val="0"/>
-              </a:spcBef>
-              <a:spcAft>
-                <a:spcPts val="0"/>
-              </a:spcAft>
-              <a:buNone/>
-            </a:pPr>
-            <a:endParaRPr sz="2100" dirty="0">
-              <a:solidFill>
-                <a:schemeClr val="lt1"/>
-              </a:solidFill>
-            </a:endParaRPr>
-          </a:p>
-          <a:p>
             <a:pPr marL="0" lvl="0" indent="0" algn="ctr" rtl="0">
               <a:spcBef>
                 <a:spcPts val="1200"/>
@@ -7959,13 +7906,18 @@
               <a:buNone/>
             </a:pPr>
             <a:r>
-              <a:rPr lang="en" sz="2000" dirty="0"/>
-              <a:t>stopping the intervals and time outs for the levels </a:t>
+              <a:rPr lang="en" sz="2000" dirty="0">
+                <a:latin typeface="Courier New" panose="02070309020205020404" pitchFamily="49" charset="0"/>
+                <a:cs typeface="Courier New" panose="02070309020205020404" pitchFamily="49" charset="0"/>
+              </a:rPr>
+              <a:t>stopping the timeouts inside the intervals (for the levels)</a:t>
             </a:r>
             <a:endParaRPr sz="2000" dirty="0">
               <a:solidFill>
                 <a:schemeClr val="lt1"/>
               </a:solidFill>
+              <a:latin typeface="Courier New" panose="02070309020205020404" pitchFamily="49" charset="0"/>
+              <a:cs typeface="Courier New" panose="02070309020205020404" pitchFamily="49" charset="0"/>
             </a:endParaRPr>
           </a:p>
         </p:txBody>
@@ -7995,39 +7947,28 @@
           </a:bodyPr>
           <a:lstStyle/>
           <a:p>
-            <a:pPr marL="0" lvl="0" indent="0" algn="l" rtl="0">
-              <a:spcBef>
-                <a:spcPts val="0"/>
-              </a:spcBef>
-              <a:spcAft>
-                <a:spcPts val="0"/>
+            <a:pPr marL="0" lvl="0" indent="0" algn="ctr" rtl="0">
+              <a:spcBef>
+                <a:spcPts val="1200"/>
+              </a:spcBef>
+              <a:spcAft>
+                <a:spcPts val="1200"/>
               </a:spcAft>
               <a:buNone/>
             </a:pPr>
-            <a:endParaRPr sz="2100" dirty="0">
+            <a:r>
+              <a:rPr lang="en" sz="2000" dirty="0">
+                <a:latin typeface="Courier New" panose="02070309020205020404" pitchFamily="49" charset="0"/>
+                <a:cs typeface="Courier New" panose="02070309020205020404" pitchFamily="49" charset="0"/>
+              </a:rPr>
+              <a:t>making the restart button resetting the levels </a:t>
+            </a:r>
+            <a:endParaRPr sz="2000" dirty="0">
               <a:solidFill>
                 <a:schemeClr val="lt1"/>
               </a:solidFill>
-            </a:endParaRPr>
-          </a:p>
-          <a:p>
-            <a:pPr marL="0" lvl="0" indent="0" algn="ctr" rtl="0">
-              <a:spcBef>
-                <a:spcPts val="1200"/>
-              </a:spcBef>
-              <a:spcAft>
-                <a:spcPts val="1200"/>
-              </a:spcAft>
-              <a:buNone/>
-            </a:pPr>
-            <a:r>
-              <a:rPr lang="en" sz="1900" dirty="0"/>
-              <a:t>making the restart button resetting the levels </a:t>
-            </a:r>
-            <a:endParaRPr sz="1900" dirty="0">
-              <a:solidFill>
-                <a:schemeClr val="lt1"/>
-              </a:solidFill>
+              <a:latin typeface="Courier New" panose="02070309020205020404" pitchFamily="49" charset="0"/>
+              <a:cs typeface="Courier New" panose="02070309020205020404" pitchFamily="49" charset="0"/>
             </a:endParaRPr>
           </a:p>
         </p:txBody>
@@ -8100,10 +8041,16 @@
               <a:buNone/>
             </a:pPr>
             <a:r>
-              <a:rPr lang="en" dirty="0"/>
+              <a:rPr lang="en" dirty="0">
+                <a:latin typeface="Courier New" panose="02070309020205020404" pitchFamily="49" charset="0"/>
+                <a:cs typeface="Courier New" panose="02070309020205020404" pitchFamily="49" charset="0"/>
+              </a:rPr>
               <a:t>Learnings</a:t>
             </a:r>
-            <a:endParaRPr dirty="0"/>
+            <a:endParaRPr dirty="0">
+              <a:latin typeface="Courier New" panose="02070309020205020404" pitchFamily="49" charset="0"/>
+              <a:cs typeface="Courier New" panose="02070309020205020404" pitchFamily="49" charset="0"/>
+            </a:endParaRPr>
           </a:p>
         </p:txBody>
       </p:sp>
@@ -8287,77 +8234,38 @@
               <a:buNone/>
             </a:pPr>
             <a:r>
-              <a:rPr lang="en" sz="2000" dirty="0"/>
+              <a:rPr lang="en" sz="2000" dirty="0">
+                <a:latin typeface="Courier New" panose="02070309020205020404" pitchFamily="49" charset="0"/>
+                <a:cs typeface="Courier New" panose="02070309020205020404" pitchFamily="49" charset="0"/>
+              </a:rPr>
               <a:t>don’t panic!</a:t>
             </a:r>
             <a:br>
-              <a:rPr lang="en" sz="2000" dirty="0"/>
+              <a:rPr lang="en" sz="2000" dirty="0">
+                <a:latin typeface="Courier New" panose="02070309020205020404" pitchFamily="49" charset="0"/>
+                <a:cs typeface="Courier New" panose="02070309020205020404" pitchFamily="49" charset="0"/>
+              </a:rPr>
             </a:br>
             <a:r>
-              <a:rPr lang="pt-PT" sz="2000" dirty="0"/>
+              <a:rPr lang="pt-PT" sz="2000" dirty="0">
+                <a:latin typeface="Courier New" panose="02070309020205020404" pitchFamily="49" charset="0"/>
+                <a:cs typeface="Courier New" panose="02070309020205020404" pitchFamily="49" charset="0"/>
+              </a:rPr>
               <a:t>d</a:t>
             </a:r>
             <a:r>
-              <a:rPr lang="en" sz="2000" dirty="0"/>
+              <a:rPr lang="en" sz="2000" dirty="0">
+                <a:latin typeface="Courier New" panose="02070309020205020404" pitchFamily="49" charset="0"/>
+                <a:cs typeface="Courier New" panose="02070309020205020404" pitchFamily="49" charset="0"/>
+              </a:rPr>
               <a:t>on’t stress! </a:t>
-            </a:r>
-            <a:br>
-              <a:rPr lang="en" sz="2000" dirty="0"/>
-            </a:br>
-            <a:r>
-              <a:rPr lang="en" sz="2000" dirty="0"/>
-              <a:t>just think</a:t>
             </a:r>
             <a:endParaRPr sz="2000" dirty="0">
               <a:solidFill>
                 <a:schemeClr val="lt1"/>
               </a:solidFill>
-            </a:endParaRPr>
-          </a:p>
-        </p:txBody>
-      </p:sp>
-      <p:sp>
-        <p:nvSpPr>
-          <p:cNvPr id="90" name="Google Shape;90;p15"/>
-          <p:cNvSpPr txBox="1"/>
-          <p:nvPr/>
-        </p:nvSpPr>
-        <p:spPr>
-          <a:xfrm>
-            <a:off x="283100" y="4654975"/>
-            <a:ext cx="6244200" cy="257700"/>
-          </a:xfrm>
-          <a:prstGeom prst="rect">
-            <a:avLst/>
-          </a:prstGeom>
-          <a:noFill/>
-          <a:ln>
-            <a:noFill/>
-          </a:ln>
-        </p:spPr>
-        <p:txBody>
-          <a:bodyPr spcFirstLastPara="1" wrap="square" lIns="91425" tIns="91425" rIns="91425" bIns="91425" anchor="ctr" anchorCtr="0">
-            <a:noAutofit/>
-          </a:bodyPr>
-          <a:lstStyle/>
-          <a:p>
-            <a:pPr marL="0" lvl="0" indent="0" algn="l" rtl="0">
-              <a:spcBef>
-                <a:spcPts val="0"/>
-              </a:spcBef>
-              <a:spcAft>
-                <a:spcPts val="0"/>
-              </a:spcAft>
-              <a:buNone/>
-            </a:pPr>
-            <a:endParaRPr sz="1200" i="1">
-              <a:solidFill>
-                <a:schemeClr val="accent5"/>
-              </a:solidFill>
-              <a:latin typeface="Lato"/>
-              <a:ea typeface="Lato"/>
-              <a:cs typeface="Lato"/>
-              <a:sym typeface="Lato"/>
+              <a:latin typeface="Courier New" panose="02070309020205020404" pitchFamily="49" charset="0"/>
+              <a:cs typeface="Courier New" panose="02070309020205020404" pitchFamily="49" charset="0"/>
             </a:endParaRPr>
           </a:p>
         </p:txBody>
@@ -8413,13 +8321,18 @@
               <a:buNone/>
             </a:pPr>
             <a:r>
-              <a:rPr lang="en-US" sz="2000" dirty="0"/>
+              <a:rPr lang="en-US" sz="2000" dirty="0">
+                <a:latin typeface="Courier New" panose="02070309020205020404" pitchFamily="49" charset="0"/>
+                <a:cs typeface="Courier New" panose="02070309020205020404" pitchFamily="49" charset="0"/>
+              </a:rPr>
               <a:t>pay attention to all details</a:t>
             </a:r>
             <a:endParaRPr lang="en-US" sz="2000" dirty="0">
               <a:solidFill>
                 <a:schemeClr val="lt1"/>
               </a:solidFill>
+              <a:latin typeface="Courier New" panose="02070309020205020404" pitchFamily="49" charset="0"/>
+              <a:cs typeface="Courier New" panose="02070309020205020404" pitchFamily="49" charset="0"/>
             </a:endParaRPr>
           </a:p>
         </p:txBody>
@@ -8475,17 +8388,25 @@
               <a:buNone/>
             </a:pPr>
             <a:r>
-              <a:rPr lang="pt-PT" sz="1900" dirty="0"/>
+              <a:rPr lang="pt-PT" sz="1900" dirty="0">
+                <a:latin typeface="Courier New" panose="02070309020205020404" pitchFamily="49" charset="0"/>
+                <a:cs typeface="Courier New" panose="02070309020205020404" pitchFamily="49" charset="0"/>
+              </a:rPr>
               <a:t>b</a:t>
             </a:r>
             <a:r>
-              <a:rPr lang="en" sz="1900" dirty="0"/>
+              <a:rPr lang="en" sz="1900" dirty="0">
+                <a:latin typeface="Courier New" panose="02070309020205020404" pitchFamily="49" charset="0"/>
+                <a:cs typeface="Courier New" panose="02070309020205020404" pitchFamily="49" charset="0"/>
+              </a:rPr>
               <a:t>efore start coding, plan the logic </a:t>
             </a:r>
             <a:endParaRPr sz="1900" dirty="0">
               <a:solidFill>
                 <a:schemeClr val="lt1"/>
               </a:solidFill>
+              <a:latin typeface="Courier New" panose="02070309020205020404" pitchFamily="49" charset="0"/>
+              <a:cs typeface="Courier New" panose="02070309020205020404" pitchFamily="49" charset="0"/>
             </a:endParaRPr>
           </a:p>
         </p:txBody>

</xml_diff>